<commit_message>
taking a look at data collection
</commit_message>
<xml_diff>
--- a/appreview.pptx
+++ b/appreview.pptx
@@ -5428,7 +5428,7 @@
           <a:p>
             <a:fld id="{1A9BCE0C-CD74-4A59-802C-6D2F8C15331A}" type="datetimeFigureOut">
               <a:rPr lang="en-US" smtClean="0"/>
-              <a:t>9/4/2020</a:t>
+              <a:t>4/15/2021</a:t>
             </a:fld>
             <a:endParaRPr lang="en-US"/>
           </a:p>
@@ -5593,7 +5593,7 @@
           <a:p>
             <a:fld id="{F04FDEA8-CBB8-46CC-9562-028963DBC55A}" type="datetimeFigureOut">
               <a:rPr lang="en-US" smtClean="0"/>
-              <a:t>9/4/2020</a:t>
+              <a:t>4/15/2021</a:t>
             </a:fld>
             <a:endParaRPr lang="en-US"/>
           </a:p>
@@ -7500,7 +7500,7 @@
           <a:p>
             <a:fld id="{37CC0096-1860-4642-9CD2-0079EA5E7CD1}" type="datetimeFigureOut">
               <a:rPr lang="en-US" smtClean="0"/>
-              <a:t>9/4/2020</a:t>
+              <a:t>4/15/2021</a:t>
             </a:fld>
             <a:endParaRPr lang="en-US"/>
           </a:p>
@@ -7701,7 +7701,7 @@
           <a:p>
             <a:fld id="{37CC0096-1860-4642-9CD2-0079EA5E7CD1}" type="datetimeFigureOut">
               <a:rPr lang="en-US" smtClean="0"/>
-              <a:t>9/4/2020</a:t>
+              <a:t>4/15/2021</a:t>
             </a:fld>
             <a:endParaRPr lang="en-US"/>
           </a:p>
@@ -8296,7 +8296,7 @@
           <a:p>
             <a:fld id="{37CC0096-1860-4642-9CD2-0079EA5E7CD1}" type="datetimeFigureOut">
               <a:rPr lang="en-US" smtClean="0"/>
-              <a:t>9/4/2020</a:t>
+              <a:t>4/15/2021</a:t>
             </a:fld>
             <a:endParaRPr lang="en-US"/>
           </a:p>
@@ -8810,7 +8810,7 @@
           <a:p>
             <a:fld id="{37CC0096-1860-4642-9CD2-0079EA5E7CD1}" type="datetimeFigureOut">
               <a:rPr lang="en-US" smtClean="0"/>
-              <a:t>9/4/2020</a:t>
+              <a:t>4/15/2021</a:t>
             </a:fld>
             <a:endParaRPr lang="en-US"/>
           </a:p>
@@ -9260,7 +9260,7 @@
           <a:p>
             <a:fld id="{37CC0096-1860-4642-9CD2-0079EA5E7CD1}" type="datetimeFigureOut">
               <a:rPr lang="en-US" smtClean="0"/>
-              <a:t>9/4/2020</a:t>
+              <a:t>4/15/2021</a:t>
             </a:fld>
             <a:endParaRPr lang="en-US"/>
           </a:p>
@@ -9392,7 +9392,7 @@
           <a:p>
             <a:fld id="{37CC0096-1860-4642-9CD2-0079EA5E7CD1}" type="datetimeFigureOut">
               <a:rPr lang="en-US" smtClean="0"/>
-              <a:t>9/4/2020</a:t>
+              <a:t>4/15/2021</a:t>
             </a:fld>
             <a:endParaRPr lang="en-US"/>
           </a:p>
@@ -9733,7 +9733,7 @@
           <a:p>
             <a:fld id="{37CC0096-1860-4642-9CD2-0079EA5E7CD1}" type="datetimeFigureOut">
               <a:rPr lang="en-US" smtClean="0"/>
-              <a:t>9/4/2020</a:t>
+              <a:t>4/15/2021</a:t>
             </a:fld>
             <a:endParaRPr lang="en-US"/>
           </a:p>
@@ -10025,7 +10025,7 @@
             <a:fld id="{37CC0096-1860-4642-9CD2-0079EA5E7CD1}" type="datetimeFigureOut">
               <a:rPr lang="en-US" smtClean="0"/>
               <a:pPr/>
-              <a:t>9/4/2020</a:t>
+              <a:t>4/15/2021</a:t>
             </a:fld>
             <a:endParaRPr lang="en-US"/>
           </a:p>

</xml_diff>